<commit_message>
Updated figures for GfÖ Poster
</commit_message>
<xml_diff>
--- a/Project_Frieda/StaticPredictors/out/figures/Fig1_NrSpPerTrendHist.pptx
+++ b/Project_Frieda/StaticPredictors/out/figures/Fig1_NrSpPerTrendHist.pptx
@@ -307,7 +307,7 @@
           <a:p>
             <a:fld id="{E6744CE3-0875-4B69-89C0-6F72D8139561}" type="datetimeFigureOut">
               <a:rPr lang="en-GB" smtClean="0"/>
-              <a:t>30/04/2024</a:t>
+              <a:t>01/05/2024</a:t>
             </a:fld>
             <a:endParaRPr lang="en-GB"/>
           </a:p>
@@ -477,7 +477,7 @@
           <a:p>
             <a:fld id="{E6744CE3-0875-4B69-89C0-6F72D8139561}" type="datetimeFigureOut">
               <a:rPr lang="en-GB" smtClean="0"/>
-              <a:t>30/04/2024</a:t>
+              <a:t>01/05/2024</a:t>
             </a:fld>
             <a:endParaRPr lang="en-GB"/>
           </a:p>
@@ -723,7 +723,7 @@
           <a:p>
             <a:fld id="{E6744CE3-0875-4B69-89C0-6F72D8139561}" type="datetimeFigureOut">
               <a:rPr lang="en-GB" smtClean="0"/>
-              <a:t>30/04/2024</a:t>
+              <a:t>01/05/2024</a:t>
             </a:fld>
             <a:endParaRPr lang="en-GB"/>
           </a:p>
@@ -1011,7 +1011,7 @@
           <a:p>
             <a:fld id="{E6744CE3-0875-4B69-89C0-6F72D8139561}" type="datetimeFigureOut">
               <a:rPr lang="en-GB" smtClean="0"/>
-              <a:t>30/04/2024</a:t>
+              <a:t>01/05/2024</a:t>
             </a:fld>
             <a:endParaRPr lang="en-GB"/>
           </a:p>
@@ -1433,7 +1433,7 @@
           <a:p>
             <a:fld id="{E6744CE3-0875-4B69-89C0-6F72D8139561}" type="datetimeFigureOut">
               <a:rPr lang="en-GB" smtClean="0"/>
-              <a:t>30/04/2024</a:t>
+              <a:t>01/05/2024</a:t>
             </a:fld>
             <a:endParaRPr lang="en-GB"/>
           </a:p>
@@ -1551,7 +1551,7 @@
           <a:p>
             <a:fld id="{E6744CE3-0875-4B69-89C0-6F72D8139561}" type="datetimeFigureOut">
               <a:rPr lang="en-GB" smtClean="0"/>
-              <a:t>30/04/2024</a:t>
+              <a:t>01/05/2024</a:t>
             </a:fld>
             <a:endParaRPr lang="en-GB"/>
           </a:p>
@@ -1646,7 +1646,7 @@
           <a:p>
             <a:fld id="{E6744CE3-0875-4B69-89C0-6F72D8139561}" type="datetimeFigureOut">
               <a:rPr lang="en-GB" smtClean="0"/>
-              <a:t>30/04/2024</a:t>
+              <a:t>01/05/2024</a:t>
             </a:fld>
             <a:endParaRPr lang="en-GB"/>
           </a:p>
@@ -1859,7 +1859,7 @@
           <a:p>
             <a:fld id="{E6744CE3-0875-4B69-89C0-6F72D8139561}" type="datetimeFigureOut">
               <a:rPr lang="en-GB" smtClean="0"/>
-              <a:t>30/04/2024</a:t>
+              <a:t>01/05/2024</a:t>
             </a:fld>
             <a:endParaRPr lang="en-GB"/>
           </a:p>
@@ -2238,10 +2238,10 @@
         </p:nvGrpSpPr>
         <p:grpSpPr>
           <a:xfrm>
-            <a:off x="14810" y="1401157"/>
-            <a:ext cx="8435280" cy="3490107"/>
-            <a:chOff x="457200" y="1584460"/>
-            <a:chExt cx="8229600" cy="4728000"/>
+            <a:off x="457200" y="1600200"/>
+            <a:ext cx="8229600" cy="4525963"/>
+            <a:chOff x="457200" y="1600200"/>
+            <a:chExt cx="8229600" cy="4525963"/>
           </a:xfrm>
         </p:grpSpPr>
         <p:sp>
@@ -2318,7 +2318,7 @@
           <p:spPr>
             <a:xfrm>
               <a:off x="1024325" y="2142458"/>
-              <a:ext cx="1846029" cy="2901326"/>
+              <a:ext cx="1846029" cy="2429599"/>
             </a:xfrm>
             <a:prstGeom prst="rect">
               <a:avLst/>
@@ -2340,7 +2340,7 @@
           </p:nvSpPr>
           <p:spPr>
             <a:xfrm>
-              <a:off x="1024325" y="4911906"/>
+              <a:off x="1024325" y="4461622"/>
               <a:ext cx="1846029" cy="0"/>
             </a:xfrm>
             <a:custGeom>
@@ -2389,7 +2389,7 @@
           </p:nvSpPr>
           <p:spPr>
             <a:xfrm>
-              <a:off x="1024325" y="4149603"/>
+              <a:off x="1024325" y="3823261"/>
               <a:ext cx="1846029" cy="0"/>
             </a:xfrm>
             <a:custGeom>
@@ -2438,7 +2438,7 @@
           </p:nvSpPr>
           <p:spPr>
             <a:xfrm>
-              <a:off x="1024325" y="3387299"/>
+              <a:off x="1024325" y="3184901"/>
               <a:ext cx="1846029" cy="0"/>
             </a:xfrm>
             <a:custGeom>
@@ -2487,7 +2487,7 @@
           </p:nvSpPr>
           <p:spPr>
             <a:xfrm>
-              <a:off x="1024325" y="2624996"/>
+              <a:off x="1024325" y="2546540"/>
               <a:ext cx="1846029" cy="0"/>
             </a:xfrm>
             <a:custGeom>
@@ -2537,7 +2537,7 @@
           <p:spPr>
             <a:xfrm>
               <a:off x="1237329" y="2142458"/>
-              <a:ext cx="0" cy="2901326"/>
+              <a:ext cx="0" cy="2429599"/>
             </a:xfrm>
             <a:custGeom>
               <a:avLst/>
@@ -2546,9 +2546,9 @@
               <a:cxnLst/>
               <a:rect l="0" t="0" r="0" b="0"/>
               <a:pathLst>
-                <a:path h="2901326">
+                <a:path h="2429599">
                   <a:moveTo>
-                    <a:pt x="0" y="2901326"/>
+                    <a:pt x="0" y="2429599"/>
                   </a:moveTo>
                   <a:lnTo>
                     <a:pt x="0" y="0"/>
@@ -2586,7 +2586,7 @@
           <p:spPr>
             <a:xfrm>
               <a:off x="1592334" y="2142458"/>
-              <a:ext cx="0" cy="2901326"/>
+              <a:ext cx="0" cy="2429599"/>
             </a:xfrm>
             <a:custGeom>
               <a:avLst/>
@@ -2595,9 +2595,9 @@
               <a:cxnLst/>
               <a:rect l="0" t="0" r="0" b="0"/>
               <a:pathLst>
-                <a:path h="2901326">
+                <a:path h="2429599">
                   <a:moveTo>
-                    <a:pt x="0" y="2901326"/>
+                    <a:pt x="0" y="2429599"/>
                   </a:moveTo>
                   <a:lnTo>
                     <a:pt x="0" y="0"/>
@@ -2635,7 +2635,7 @@
           <p:spPr>
             <a:xfrm>
               <a:off x="1947340" y="2142458"/>
-              <a:ext cx="0" cy="2901326"/>
+              <a:ext cx="0" cy="2429599"/>
             </a:xfrm>
             <a:custGeom>
               <a:avLst/>
@@ -2644,9 +2644,9 @@
               <a:cxnLst/>
               <a:rect l="0" t="0" r="0" b="0"/>
               <a:pathLst>
-                <a:path h="2901326">
+                <a:path h="2429599">
                   <a:moveTo>
-                    <a:pt x="0" y="2901326"/>
+                    <a:pt x="0" y="2429599"/>
                   </a:moveTo>
                   <a:lnTo>
                     <a:pt x="0" y="0"/>
@@ -2684,7 +2684,7 @@
           <p:spPr>
             <a:xfrm>
               <a:off x="2302346" y="2142458"/>
-              <a:ext cx="0" cy="2901326"/>
+              <a:ext cx="0" cy="2429599"/>
             </a:xfrm>
             <a:custGeom>
               <a:avLst/>
@@ -2693,9 +2693,9 @@
               <a:cxnLst/>
               <a:rect l="0" t="0" r="0" b="0"/>
               <a:pathLst>
-                <a:path h="2901326">
+                <a:path h="2429599">
                   <a:moveTo>
-                    <a:pt x="0" y="2901326"/>
+                    <a:pt x="0" y="2429599"/>
                   </a:moveTo>
                   <a:lnTo>
                     <a:pt x="0" y="0"/>
@@ -2733,7 +2733,7 @@
           <p:spPr>
             <a:xfrm>
               <a:off x="2657351" y="2142458"/>
-              <a:ext cx="0" cy="2901326"/>
+              <a:ext cx="0" cy="2429599"/>
             </a:xfrm>
             <a:custGeom>
               <a:avLst/>
@@ -2742,9 +2742,9 @@
               <a:cxnLst/>
               <a:rect l="0" t="0" r="0" b="0"/>
               <a:pathLst>
-                <a:path h="2901326">
+                <a:path h="2429599">
                   <a:moveTo>
-                    <a:pt x="0" y="2901326"/>
+                    <a:pt x="0" y="2429599"/>
                   </a:moveTo>
                   <a:lnTo>
                     <a:pt x="0" y="0"/>
@@ -2781,17 +2781,26 @@
           </p:nvSpPr>
           <p:spPr>
             <a:xfrm>
-              <a:off x="1077576" y="4850922"/>
-              <a:ext cx="319505" cy="60984"/>
+              <a:off x="1077576" y="4410553"/>
+              <a:ext cx="319505" cy="51068"/>
             </a:xfrm>
             <a:prstGeom prst="rect">
               <a:avLst/>
             </a:prstGeom>
             <a:solidFill>
-              <a:srgbClr val="D7191C">
+              <a:srgbClr val="E66101">
                 <a:alpha val="100000"/>
               </a:srgbClr>
             </a:solidFill>
+            <a:ln w="13550" cap="flat">
+              <a:solidFill>
+                <a:srgbClr val="D3D3D3">
+                  <a:alpha val="100000"/>
+                </a:srgbClr>
+              </a:solidFill>
+              <a:prstDash val="solid"/>
+              <a:miter/>
+            </a:ln>
           </p:spPr>
           <p:txBody>
             <a:bodyPr/>
@@ -2809,17 +2818,26 @@
           </p:nvSpPr>
           <p:spPr>
             <a:xfrm>
-              <a:off x="1432582" y="4561246"/>
-              <a:ext cx="319505" cy="350659"/>
+              <a:off x="1432582" y="4167976"/>
+              <a:ext cx="319505" cy="293645"/>
             </a:xfrm>
             <a:prstGeom prst="rect">
               <a:avLst/>
             </a:prstGeom>
             <a:solidFill>
-              <a:srgbClr val="FDAE61">
+              <a:srgbClr val="FDB863">
                 <a:alpha val="100000"/>
               </a:srgbClr>
             </a:solidFill>
+            <a:ln w="13550" cap="flat">
+              <a:solidFill>
+                <a:srgbClr val="D3D3D3">
+                  <a:alpha val="100000"/>
+                </a:srgbClr>
+              </a:solidFill>
+              <a:prstDash val="solid"/>
+              <a:miter/>
+            </a:ln>
           </p:spPr>
           <p:txBody>
             <a:bodyPr/>
@@ -2837,17 +2855,26 @@
           </p:nvSpPr>
           <p:spPr>
             <a:xfrm>
-              <a:off x="1787587" y="3341561"/>
-              <a:ext cx="319505" cy="1570344"/>
+              <a:off x="1787587" y="3146599"/>
+              <a:ext cx="319505" cy="1315022"/>
             </a:xfrm>
             <a:prstGeom prst="rect">
               <a:avLst/>
             </a:prstGeom>
             <a:solidFill>
-              <a:srgbClr val="FFFFBF">
+              <a:srgbClr val="F7F7F7">
                 <a:alpha val="100000"/>
               </a:srgbClr>
             </a:solidFill>
+            <a:ln w="13550" cap="flat">
+              <a:solidFill>
+                <a:srgbClr val="D3D3D3">
+                  <a:alpha val="100000"/>
+                </a:srgbClr>
+              </a:solidFill>
+              <a:prstDash val="solid"/>
+              <a:miter/>
+            </a:ln>
           </p:spPr>
           <p:txBody>
             <a:bodyPr/>
@@ -2865,17 +2892,26 @@
           </p:nvSpPr>
           <p:spPr>
             <a:xfrm>
-              <a:off x="2142593" y="4225833"/>
-              <a:ext cx="319505" cy="686073"/>
+              <a:off x="2142593" y="3887097"/>
+              <a:ext cx="319505" cy="574524"/>
             </a:xfrm>
             <a:prstGeom prst="rect">
               <a:avLst/>
             </a:prstGeom>
             <a:solidFill>
-              <a:srgbClr val="ABD9E9">
+              <a:srgbClr val="B2ABD2">
                 <a:alpha val="100000"/>
               </a:srgbClr>
             </a:solidFill>
+            <a:ln w="13550" cap="flat">
+              <a:solidFill>
+                <a:srgbClr val="D3D3D3">
+                  <a:alpha val="100000"/>
+                </a:srgbClr>
+              </a:solidFill>
+              <a:prstDash val="solid"/>
+              <a:miter/>
+            </a:ln>
           </p:spPr>
           <p:txBody>
             <a:bodyPr/>
@@ -2893,17 +2929,26 @@
           </p:nvSpPr>
           <p:spPr>
             <a:xfrm>
-              <a:off x="2497599" y="4606985"/>
-              <a:ext cx="319505" cy="304921"/>
+              <a:off x="2497599" y="4206277"/>
+              <a:ext cx="319505" cy="255344"/>
             </a:xfrm>
             <a:prstGeom prst="rect">
               <a:avLst/>
             </a:prstGeom>
             <a:solidFill>
-              <a:srgbClr val="2C7BB6">
+              <a:srgbClr val="5E3C99">
                 <a:alpha val="100000"/>
               </a:srgbClr>
             </a:solidFill>
+            <a:ln w="13550" cap="flat">
+              <a:solidFill>
+                <a:srgbClr val="D3D3D3">
+                  <a:alpha val="100000"/>
+                </a:srgbClr>
+              </a:solidFill>
+              <a:prstDash val="solid"/>
+              <a:miter/>
+            </a:ln>
           </p:spPr>
           <p:txBody>
             <a:bodyPr/>
@@ -2922,7 +2967,7 @@
           <p:spPr>
             <a:xfrm>
               <a:off x="2939944" y="2142458"/>
-              <a:ext cx="1846029" cy="2901326"/>
+              <a:ext cx="1846029" cy="2429599"/>
             </a:xfrm>
             <a:prstGeom prst="rect">
               <a:avLst/>
@@ -2944,7 +2989,7 @@
           </p:nvSpPr>
           <p:spPr>
             <a:xfrm>
-              <a:off x="2939944" y="4911906"/>
+              <a:off x="2939944" y="4461622"/>
               <a:ext cx="1846029" cy="0"/>
             </a:xfrm>
             <a:custGeom>
@@ -2993,7 +3038,7 @@
           </p:nvSpPr>
           <p:spPr>
             <a:xfrm>
-              <a:off x="2939944" y="4149603"/>
+              <a:off x="2939944" y="3823261"/>
               <a:ext cx="1846029" cy="0"/>
             </a:xfrm>
             <a:custGeom>
@@ -3042,7 +3087,7 @@
           </p:nvSpPr>
           <p:spPr>
             <a:xfrm>
-              <a:off x="2939944" y="3387299"/>
+              <a:off x="2939944" y="3184901"/>
               <a:ext cx="1846029" cy="0"/>
             </a:xfrm>
             <a:custGeom>
@@ -3091,7 +3136,7 @@
           </p:nvSpPr>
           <p:spPr>
             <a:xfrm>
-              <a:off x="2939944" y="2624996"/>
+              <a:off x="2939944" y="2546540"/>
               <a:ext cx="1846029" cy="0"/>
             </a:xfrm>
             <a:custGeom>
@@ -3141,7 +3186,7 @@
           <p:spPr>
             <a:xfrm>
               <a:off x="3152947" y="2142458"/>
-              <a:ext cx="0" cy="2901326"/>
+              <a:ext cx="0" cy="2429599"/>
             </a:xfrm>
             <a:custGeom>
               <a:avLst/>
@@ -3150,9 +3195,9 @@
               <a:cxnLst/>
               <a:rect l="0" t="0" r="0" b="0"/>
               <a:pathLst>
-                <a:path h="2901326">
+                <a:path h="2429599">
                   <a:moveTo>
-                    <a:pt x="0" y="2901326"/>
+                    <a:pt x="0" y="2429599"/>
                   </a:moveTo>
                   <a:lnTo>
                     <a:pt x="0" y="0"/>
@@ -3190,7 +3235,7 @@
           <p:spPr>
             <a:xfrm>
               <a:off x="3507953" y="2142458"/>
-              <a:ext cx="0" cy="2901326"/>
+              <a:ext cx="0" cy="2429599"/>
             </a:xfrm>
             <a:custGeom>
               <a:avLst/>
@@ -3199,9 +3244,9 @@
               <a:cxnLst/>
               <a:rect l="0" t="0" r="0" b="0"/>
               <a:pathLst>
-                <a:path h="2901326">
+                <a:path h="2429599">
                   <a:moveTo>
-                    <a:pt x="0" y="2901326"/>
+                    <a:pt x="0" y="2429599"/>
                   </a:moveTo>
                   <a:lnTo>
                     <a:pt x="0" y="0"/>
@@ -3239,7 +3284,7 @@
           <p:spPr>
             <a:xfrm>
               <a:off x="3862959" y="2142458"/>
-              <a:ext cx="0" cy="2901326"/>
+              <a:ext cx="0" cy="2429599"/>
             </a:xfrm>
             <a:custGeom>
               <a:avLst/>
@@ -3248,9 +3293,9 @@
               <a:cxnLst/>
               <a:rect l="0" t="0" r="0" b="0"/>
               <a:pathLst>
-                <a:path h="2901326">
+                <a:path h="2429599">
                   <a:moveTo>
-                    <a:pt x="0" y="2901326"/>
+                    <a:pt x="0" y="2429599"/>
                   </a:moveTo>
                   <a:lnTo>
                     <a:pt x="0" y="0"/>
@@ -3288,7 +3333,7 @@
           <p:spPr>
             <a:xfrm>
               <a:off x="4217964" y="2142458"/>
-              <a:ext cx="0" cy="2901326"/>
+              <a:ext cx="0" cy="2429599"/>
             </a:xfrm>
             <a:custGeom>
               <a:avLst/>
@@ -3297,9 +3342,9 @@
               <a:cxnLst/>
               <a:rect l="0" t="0" r="0" b="0"/>
               <a:pathLst>
-                <a:path h="2901326">
+                <a:path h="2429599">
                   <a:moveTo>
-                    <a:pt x="0" y="2901326"/>
+                    <a:pt x="0" y="2429599"/>
                   </a:moveTo>
                   <a:lnTo>
                     <a:pt x="0" y="0"/>
@@ -3337,7 +3382,7 @@
           <p:spPr>
             <a:xfrm>
               <a:off x="4572970" y="2142458"/>
-              <a:ext cx="0" cy="2901326"/>
+              <a:ext cx="0" cy="2429599"/>
             </a:xfrm>
             <a:custGeom>
               <a:avLst/>
@@ -3346,9 +3391,9 @@
               <a:cxnLst/>
               <a:rect l="0" t="0" r="0" b="0"/>
               <a:pathLst>
-                <a:path h="2901326">
+                <a:path h="2429599">
                   <a:moveTo>
-                    <a:pt x="0" y="2901326"/>
+                    <a:pt x="0" y="2429599"/>
                   </a:moveTo>
                   <a:lnTo>
                     <a:pt x="0" y="0"/>
@@ -3385,17 +3430,26 @@
           </p:nvSpPr>
           <p:spPr>
             <a:xfrm>
-              <a:off x="2993195" y="4805183"/>
-              <a:ext cx="319505" cy="106722"/>
+              <a:off x="2993195" y="4372251"/>
+              <a:ext cx="319505" cy="89370"/>
             </a:xfrm>
             <a:prstGeom prst="rect">
               <a:avLst/>
             </a:prstGeom>
             <a:solidFill>
-              <a:srgbClr val="D7191C">
+              <a:srgbClr val="E66101">
                 <a:alpha val="100000"/>
               </a:srgbClr>
             </a:solidFill>
+            <a:ln w="13550" cap="flat">
+              <a:solidFill>
+                <a:srgbClr val="D3D3D3">
+                  <a:alpha val="100000"/>
+                </a:srgbClr>
+              </a:solidFill>
+              <a:prstDash val="solid"/>
+              <a:miter/>
+            </a:ln>
           </p:spPr>
           <p:txBody>
             <a:bodyPr/>
@@ -3413,17 +3467,26 @@
           </p:nvSpPr>
           <p:spPr>
             <a:xfrm>
-              <a:off x="3348200" y="4027634"/>
-              <a:ext cx="319505" cy="884271"/>
+              <a:off x="3348200" y="3721123"/>
+              <a:ext cx="319505" cy="740498"/>
             </a:xfrm>
             <a:prstGeom prst="rect">
               <a:avLst/>
             </a:prstGeom>
             <a:solidFill>
-              <a:srgbClr val="FDAE61">
+              <a:srgbClr val="FDB863">
                 <a:alpha val="100000"/>
               </a:srgbClr>
             </a:solidFill>
+            <a:ln w="13550" cap="flat">
+              <a:solidFill>
+                <a:srgbClr val="D3D3D3">
+                  <a:alpha val="100000"/>
+                </a:srgbClr>
+              </a:solidFill>
+              <a:prstDash val="solid"/>
+              <a:miter/>
+            </a:ln>
           </p:spPr>
           <p:txBody>
             <a:bodyPr/>
@@ -3441,17 +3504,26 @@
           </p:nvSpPr>
           <p:spPr>
             <a:xfrm>
-              <a:off x="3703206" y="2274336"/>
-              <a:ext cx="319505" cy="2637569"/>
+              <a:off x="3703206" y="2252894"/>
+              <a:ext cx="319505" cy="2208727"/>
             </a:xfrm>
             <a:prstGeom prst="rect">
               <a:avLst/>
             </a:prstGeom>
             <a:solidFill>
-              <a:srgbClr val="FFFFBF">
+              <a:srgbClr val="F7F7F7">
                 <a:alpha val="100000"/>
               </a:srgbClr>
             </a:solidFill>
+            <a:ln w="13550" cap="flat">
+              <a:solidFill>
+                <a:srgbClr val="D3D3D3">
+                  <a:alpha val="100000"/>
+                </a:srgbClr>
+              </a:solidFill>
+              <a:prstDash val="solid"/>
+              <a:miter/>
+            </a:ln>
           </p:spPr>
           <p:txBody>
             <a:bodyPr/>
@@ -3469,17 +3541,26 @@
           </p:nvSpPr>
           <p:spPr>
             <a:xfrm>
-              <a:off x="4058212" y="2731718"/>
-              <a:ext cx="319505" cy="2180187"/>
+              <a:off x="4058212" y="2635911"/>
+              <a:ext cx="319505" cy="1825710"/>
             </a:xfrm>
             <a:prstGeom prst="rect">
               <a:avLst/>
             </a:prstGeom>
             <a:solidFill>
-              <a:srgbClr val="ABD9E9">
+              <a:srgbClr val="B2ABD2">
                 <a:alpha val="100000"/>
               </a:srgbClr>
             </a:solidFill>
+            <a:ln w="13550" cap="flat">
+              <a:solidFill>
+                <a:srgbClr val="D3D3D3">
+                  <a:alpha val="100000"/>
+                </a:srgbClr>
+              </a:solidFill>
+              <a:prstDash val="solid"/>
+              <a:miter/>
+            </a:ln>
           </p:spPr>
           <p:txBody>
             <a:bodyPr/>
@@ -3497,17 +3578,26 @@
           </p:nvSpPr>
           <p:spPr>
             <a:xfrm>
-              <a:off x="4413217" y="4332555"/>
-              <a:ext cx="319505" cy="579350"/>
+              <a:off x="4413217" y="3976468"/>
+              <a:ext cx="319505" cy="485153"/>
             </a:xfrm>
             <a:prstGeom prst="rect">
               <a:avLst/>
             </a:prstGeom>
             <a:solidFill>
-              <a:srgbClr val="2C7BB6">
+              <a:srgbClr val="5E3C99">
                 <a:alpha val="100000"/>
               </a:srgbClr>
             </a:solidFill>
+            <a:ln w="13550" cap="flat">
+              <a:solidFill>
+                <a:srgbClr val="D3D3D3">
+                  <a:alpha val="100000"/>
+                </a:srgbClr>
+              </a:solidFill>
+              <a:prstDash val="solid"/>
+              <a:miter/>
+            </a:ln>
           </p:spPr>
           <p:txBody>
             <a:bodyPr/>
@@ -3526,7 +3616,7 @@
           <p:spPr>
             <a:xfrm>
               <a:off x="4855562" y="2142458"/>
-              <a:ext cx="1846029" cy="2901326"/>
+              <a:ext cx="1846029" cy="2429599"/>
             </a:xfrm>
             <a:prstGeom prst="rect">
               <a:avLst/>
@@ -3548,7 +3638,7 @@
           </p:nvSpPr>
           <p:spPr>
             <a:xfrm>
-              <a:off x="4855562" y="4911906"/>
+              <a:off x="4855562" y="4461622"/>
               <a:ext cx="1846029" cy="0"/>
             </a:xfrm>
             <a:custGeom>
@@ -3597,7 +3687,7 @@
           </p:nvSpPr>
           <p:spPr>
             <a:xfrm>
-              <a:off x="4855562" y="4149603"/>
+              <a:off x="4855562" y="3823261"/>
               <a:ext cx="1846029" cy="0"/>
             </a:xfrm>
             <a:custGeom>
@@ -3646,7 +3736,7 @@
           </p:nvSpPr>
           <p:spPr>
             <a:xfrm>
-              <a:off x="4855562" y="3387299"/>
+              <a:off x="4855562" y="3184901"/>
               <a:ext cx="1846029" cy="0"/>
             </a:xfrm>
             <a:custGeom>
@@ -3695,7 +3785,7 @@
           </p:nvSpPr>
           <p:spPr>
             <a:xfrm>
-              <a:off x="4855562" y="2624996"/>
+              <a:off x="4855562" y="2546540"/>
               <a:ext cx="1846029" cy="0"/>
             </a:xfrm>
             <a:custGeom>
@@ -3745,7 +3835,7 @@
           <p:spPr>
             <a:xfrm>
               <a:off x="5068566" y="2142458"/>
-              <a:ext cx="0" cy="2901326"/>
+              <a:ext cx="0" cy="2429599"/>
             </a:xfrm>
             <a:custGeom>
               <a:avLst/>
@@ -3754,9 +3844,9 @@
               <a:cxnLst/>
               <a:rect l="0" t="0" r="0" b="0"/>
               <a:pathLst>
-                <a:path h="2901326">
+                <a:path h="2429599">
                   <a:moveTo>
-                    <a:pt x="0" y="2901326"/>
+                    <a:pt x="0" y="2429599"/>
                   </a:moveTo>
                   <a:lnTo>
                     <a:pt x="0" y="0"/>
@@ -3794,7 +3884,7 @@
           <p:spPr>
             <a:xfrm>
               <a:off x="5423571" y="2142458"/>
-              <a:ext cx="0" cy="2901326"/>
+              <a:ext cx="0" cy="2429599"/>
             </a:xfrm>
             <a:custGeom>
               <a:avLst/>
@@ -3803,9 +3893,9 @@
               <a:cxnLst/>
               <a:rect l="0" t="0" r="0" b="0"/>
               <a:pathLst>
-                <a:path h="2901326">
+                <a:path h="2429599">
                   <a:moveTo>
-                    <a:pt x="0" y="2901326"/>
+                    <a:pt x="0" y="2429599"/>
                   </a:moveTo>
                   <a:lnTo>
                     <a:pt x="0" y="0"/>
@@ -3843,7 +3933,7 @@
           <p:spPr>
             <a:xfrm>
               <a:off x="5778577" y="2142458"/>
-              <a:ext cx="0" cy="2901326"/>
+              <a:ext cx="0" cy="2429599"/>
             </a:xfrm>
             <a:custGeom>
               <a:avLst/>
@@ -3852,9 +3942,9 @@
               <a:cxnLst/>
               <a:rect l="0" t="0" r="0" b="0"/>
               <a:pathLst>
-                <a:path h="2901326">
+                <a:path h="2429599">
                   <a:moveTo>
-                    <a:pt x="0" y="2901326"/>
+                    <a:pt x="0" y="2429599"/>
                   </a:moveTo>
                   <a:lnTo>
                     <a:pt x="0" y="0"/>
@@ -3892,7 +3982,7 @@
           <p:spPr>
             <a:xfrm>
               <a:off x="6133583" y="2142458"/>
-              <a:ext cx="0" cy="2901326"/>
+              <a:ext cx="0" cy="2429599"/>
             </a:xfrm>
             <a:custGeom>
               <a:avLst/>
@@ -3901,9 +3991,9 @@
               <a:cxnLst/>
               <a:rect l="0" t="0" r="0" b="0"/>
               <a:pathLst>
-                <a:path h="2901326">
+                <a:path h="2429599">
                   <a:moveTo>
-                    <a:pt x="0" y="2901326"/>
+                    <a:pt x="0" y="2429599"/>
                   </a:moveTo>
                   <a:lnTo>
                     <a:pt x="0" y="0"/>
@@ -3941,7 +4031,7 @@
           <p:spPr>
             <a:xfrm>
               <a:off x="6488588" y="2142458"/>
-              <a:ext cx="0" cy="2901326"/>
+              <a:ext cx="0" cy="2429599"/>
             </a:xfrm>
             <a:custGeom>
               <a:avLst/>
@@ -3950,9 +4040,9 @@
               <a:cxnLst/>
               <a:rect l="0" t="0" r="0" b="0"/>
               <a:pathLst>
-                <a:path h="2901326">
+                <a:path h="2429599">
                   <a:moveTo>
-                    <a:pt x="0" y="2901326"/>
+                    <a:pt x="0" y="2429599"/>
                   </a:moveTo>
                   <a:lnTo>
                     <a:pt x="0" y="0"/>
@@ -3989,17 +4079,26 @@
           </p:nvSpPr>
           <p:spPr>
             <a:xfrm>
-              <a:off x="4908813" y="4576492"/>
-              <a:ext cx="319505" cy="335413"/>
+              <a:off x="4908813" y="4180743"/>
+              <a:ext cx="319505" cy="280878"/>
             </a:xfrm>
             <a:prstGeom prst="rect">
               <a:avLst/>
             </a:prstGeom>
             <a:solidFill>
-              <a:srgbClr val="D7191C">
+              <a:srgbClr val="E66101">
                 <a:alpha val="100000"/>
               </a:srgbClr>
             </a:solidFill>
+            <a:ln w="13550" cap="flat">
+              <a:solidFill>
+                <a:srgbClr val="D3D3D3">
+                  <a:alpha val="100000"/>
+                </a:srgbClr>
+              </a:solidFill>
+              <a:prstDash val="solid"/>
+              <a:miter/>
+            </a:ln>
           </p:spPr>
           <p:txBody>
             <a:bodyPr/>
@@ -4017,17 +4116,26 @@
           </p:nvSpPr>
           <p:spPr>
             <a:xfrm>
-              <a:off x="5263819" y="3997142"/>
-              <a:ext cx="319505" cy="914764"/>
+              <a:off x="5263819" y="3695589"/>
+              <a:ext cx="319505" cy="766032"/>
             </a:xfrm>
             <a:prstGeom prst="rect">
               <a:avLst/>
             </a:prstGeom>
             <a:solidFill>
-              <a:srgbClr val="FDAE61">
+              <a:srgbClr val="FDB863">
                 <a:alpha val="100000"/>
               </a:srgbClr>
             </a:solidFill>
+            <a:ln w="13550" cap="flat">
+              <a:solidFill>
+                <a:srgbClr val="D3D3D3">
+                  <a:alpha val="100000"/>
+                </a:srgbClr>
+              </a:solidFill>
+              <a:prstDash val="solid"/>
+              <a:miter/>
+            </a:ln>
           </p:spPr>
           <p:txBody>
             <a:bodyPr/>
@@ -4045,17 +4153,26 @@
           </p:nvSpPr>
           <p:spPr>
             <a:xfrm>
-              <a:off x="5618825" y="4058126"/>
-              <a:ext cx="319505" cy="853779"/>
+              <a:off x="5618825" y="3746658"/>
+              <a:ext cx="319505" cy="714963"/>
             </a:xfrm>
             <a:prstGeom prst="rect">
               <a:avLst/>
             </a:prstGeom>
             <a:solidFill>
-              <a:srgbClr val="FFFFBF">
+              <a:srgbClr val="F7F7F7">
                 <a:alpha val="100000"/>
               </a:srgbClr>
             </a:solidFill>
+            <a:ln w="13550" cap="flat">
+              <a:solidFill>
+                <a:srgbClr val="D3D3D3">
+                  <a:alpha val="100000"/>
+                </a:srgbClr>
+              </a:solidFill>
+              <a:prstDash val="solid"/>
+              <a:miter/>
+            </a:ln>
           </p:spPr>
           <p:txBody>
             <a:bodyPr/>
@@ -4073,17 +4190,26 @@
           </p:nvSpPr>
           <p:spPr>
             <a:xfrm>
-              <a:off x="5973830" y="4180095"/>
-              <a:ext cx="319505" cy="731811"/>
+              <a:off x="5973830" y="3848795"/>
+              <a:ext cx="319505" cy="612826"/>
             </a:xfrm>
             <a:prstGeom prst="rect">
               <a:avLst/>
             </a:prstGeom>
             <a:solidFill>
-              <a:srgbClr val="ABD9E9">
+              <a:srgbClr val="B2ABD2">
                 <a:alpha val="100000"/>
               </a:srgbClr>
             </a:solidFill>
+            <a:ln w="13550" cap="flat">
+              <a:solidFill>
+                <a:srgbClr val="D3D3D3">
+                  <a:alpha val="100000"/>
+                </a:srgbClr>
+              </a:solidFill>
+              <a:prstDash val="solid"/>
+              <a:miter/>
+            </a:ln>
           </p:spPr>
           <p:txBody>
             <a:bodyPr/>
@@ -4101,17 +4227,26 @@
           </p:nvSpPr>
           <p:spPr>
             <a:xfrm>
-              <a:off x="6328836" y="4667969"/>
-              <a:ext cx="319505" cy="243937"/>
+              <a:off x="6328836" y="4257346"/>
+              <a:ext cx="319505" cy="204275"/>
             </a:xfrm>
             <a:prstGeom prst="rect">
               <a:avLst/>
             </a:prstGeom>
             <a:solidFill>
-              <a:srgbClr val="2C7BB6">
+              <a:srgbClr val="5E3C99">
                 <a:alpha val="100000"/>
               </a:srgbClr>
             </a:solidFill>
+            <a:ln w="13550" cap="flat">
+              <a:solidFill>
+                <a:srgbClr val="D3D3D3">
+                  <a:alpha val="100000"/>
+                </a:srgbClr>
+              </a:solidFill>
+              <a:prstDash val="solid"/>
+              <a:miter/>
+            </a:ln>
           </p:spPr>
           <p:txBody>
             <a:bodyPr/>
@@ -4130,7 +4265,7 @@
           <p:spPr>
             <a:xfrm>
               <a:off x="6771181" y="2142458"/>
-              <a:ext cx="1846029" cy="2901326"/>
+              <a:ext cx="1846029" cy="2429599"/>
             </a:xfrm>
             <a:prstGeom prst="rect">
               <a:avLst/>
@@ -4152,7 +4287,7 @@
           </p:nvSpPr>
           <p:spPr>
             <a:xfrm>
-              <a:off x="6771181" y="4911906"/>
+              <a:off x="6771181" y="4461622"/>
               <a:ext cx="1846029" cy="0"/>
             </a:xfrm>
             <a:custGeom>
@@ -4201,7 +4336,7 @@
           </p:nvSpPr>
           <p:spPr>
             <a:xfrm>
-              <a:off x="6771181" y="4149603"/>
+              <a:off x="6771181" y="3823261"/>
               <a:ext cx="1846029" cy="0"/>
             </a:xfrm>
             <a:custGeom>
@@ -4250,7 +4385,7 @@
           </p:nvSpPr>
           <p:spPr>
             <a:xfrm>
-              <a:off x="6771181" y="3387299"/>
+              <a:off x="6771181" y="3184901"/>
               <a:ext cx="1846029" cy="0"/>
             </a:xfrm>
             <a:custGeom>
@@ -4299,7 +4434,7 @@
           </p:nvSpPr>
           <p:spPr>
             <a:xfrm>
-              <a:off x="6771181" y="2624996"/>
+              <a:off x="6771181" y="2546540"/>
               <a:ext cx="1846029" cy="0"/>
             </a:xfrm>
             <a:custGeom>
@@ -4349,7 +4484,7 @@
           <p:spPr>
             <a:xfrm>
               <a:off x="6984184" y="2142458"/>
-              <a:ext cx="0" cy="2901326"/>
+              <a:ext cx="0" cy="2429599"/>
             </a:xfrm>
             <a:custGeom>
               <a:avLst/>
@@ -4358,9 +4493,9 @@
               <a:cxnLst/>
               <a:rect l="0" t="0" r="0" b="0"/>
               <a:pathLst>
-                <a:path h="2901326">
+                <a:path h="2429599">
                   <a:moveTo>
-                    <a:pt x="0" y="2901326"/>
+                    <a:pt x="0" y="2429599"/>
                   </a:moveTo>
                   <a:lnTo>
                     <a:pt x="0" y="0"/>
@@ -4398,7 +4533,7 @@
           <p:spPr>
             <a:xfrm>
               <a:off x="7339190" y="2142458"/>
-              <a:ext cx="0" cy="2901326"/>
+              <a:ext cx="0" cy="2429599"/>
             </a:xfrm>
             <a:custGeom>
               <a:avLst/>
@@ -4407,9 +4542,9 @@
               <a:cxnLst/>
               <a:rect l="0" t="0" r="0" b="0"/>
               <a:pathLst>
-                <a:path h="2901326">
+                <a:path h="2429599">
                   <a:moveTo>
-                    <a:pt x="0" y="2901326"/>
+                    <a:pt x="0" y="2429599"/>
                   </a:moveTo>
                   <a:lnTo>
                     <a:pt x="0" y="0"/>
@@ -4447,7 +4582,7 @@
           <p:spPr>
             <a:xfrm>
               <a:off x="7694196" y="2142458"/>
-              <a:ext cx="0" cy="2901326"/>
+              <a:ext cx="0" cy="2429599"/>
             </a:xfrm>
             <a:custGeom>
               <a:avLst/>
@@ -4456,9 +4591,9 @@
               <a:cxnLst/>
               <a:rect l="0" t="0" r="0" b="0"/>
               <a:pathLst>
-                <a:path h="2901326">
+                <a:path h="2429599">
                   <a:moveTo>
-                    <a:pt x="0" y="2901326"/>
+                    <a:pt x="0" y="2429599"/>
                   </a:moveTo>
                   <a:lnTo>
                     <a:pt x="0" y="0"/>
@@ -4496,7 +4631,7 @@
           <p:spPr>
             <a:xfrm>
               <a:off x="8049201" y="2142458"/>
-              <a:ext cx="0" cy="2901326"/>
+              <a:ext cx="0" cy="2429599"/>
             </a:xfrm>
             <a:custGeom>
               <a:avLst/>
@@ -4505,9 +4640,9 @@
               <a:cxnLst/>
               <a:rect l="0" t="0" r="0" b="0"/>
               <a:pathLst>
-                <a:path h="2901326">
+                <a:path h="2429599">
                   <a:moveTo>
-                    <a:pt x="0" y="2901326"/>
+                    <a:pt x="0" y="2429599"/>
                   </a:moveTo>
                   <a:lnTo>
                     <a:pt x="0" y="0"/>
@@ -4545,7 +4680,7 @@
           <p:spPr>
             <a:xfrm>
               <a:off x="8404207" y="2142458"/>
-              <a:ext cx="0" cy="2901326"/>
+              <a:ext cx="0" cy="2429599"/>
             </a:xfrm>
             <a:custGeom>
               <a:avLst/>
@@ -4554,9 +4689,9 @@
               <a:cxnLst/>
               <a:rect l="0" t="0" r="0" b="0"/>
               <a:pathLst>
-                <a:path h="2901326">
+                <a:path h="2429599">
                   <a:moveTo>
-                    <a:pt x="0" y="2901326"/>
+                    <a:pt x="0" y="2429599"/>
                   </a:moveTo>
                   <a:lnTo>
                     <a:pt x="0" y="0"/>
@@ -4593,17 +4728,26 @@
           </p:nvSpPr>
           <p:spPr>
             <a:xfrm>
-              <a:off x="6824432" y="4637477"/>
-              <a:ext cx="319505" cy="274429"/>
+              <a:off x="6824432" y="4231812"/>
+              <a:ext cx="319505" cy="229809"/>
             </a:xfrm>
             <a:prstGeom prst="rect">
               <a:avLst/>
             </a:prstGeom>
             <a:solidFill>
-              <a:srgbClr val="D7191C">
+              <a:srgbClr val="E66101">
                 <a:alpha val="100000"/>
               </a:srgbClr>
             </a:solidFill>
+            <a:ln w="13550" cap="flat">
+              <a:solidFill>
+                <a:srgbClr val="D3D3D3">
+                  <a:alpha val="100000"/>
+                </a:srgbClr>
+              </a:solidFill>
+              <a:prstDash val="solid"/>
+              <a:miter/>
+            </a:ln>
           </p:spPr>
           <p:txBody>
             <a:bodyPr/>
@@ -4621,17 +4765,26 @@
           </p:nvSpPr>
           <p:spPr>
             <a:xfrm>
-              <a:off x="7179437" y="4134357"/>
-              <a:ext cx="319505" cy="777549"/>
+              <a:off x="7179437" y="3810494"/>
+              <a:ext cx="319505" cy="651127"/>
             </a:xfrm>
             <a:prstGeom prst="rect">
               <a:avLst/>
             </a:prstGeom>
             <a:solidFill>
-              <a:srgbClr val="FDAE61">
+              <a:srgbClr val="FDB863">
                 <a:alpha val="100000"/>
               </a:srgbClr>
             </a:solidFill>
+            <a:ln w="13550" cap="flat">
+              <a:solidFill>
+                <a:srgbClr val="D3D3D3">
+                  <a:alpha val="100000"/>
+                </a:srgbClr>
+              </a:solidFill>
+              <a:prstDash val="solid"/>
+              <a:miter/>
+            </a:ln>
           </p:spPr>
           <p:txBody>
             <a:bodyPr/>
@@ -4649,17 +4802,26 @@
           </p:nvSpPr>
           <p:spPr>
             <a:xfrm>
-              <a:off x="7534443" y="3676975"/>
-              <a:ext cx="319505" cy="1234931"/>
+              <a:off x="7534443" y="3427478"/>
+              <a:ext cx="319505" cy="1034143"/>
             </a:xfrm>
             <a:prstGeom prst="rect">
               <a:avLst/>
             </a:prstGeom>
             <a:solidFill>
-              <a:srgbClr val="FFFFBF">
+              <a:srgbClr val="F7F7F7">
                 <a:alpha val="100000"/>
               </a:srgbClr>
             </a:solidFill>
+            <a:ln w="13550" cap="flat">
+              <a:solidFill>
+                <a:srgbClr val="D3D3D3">
+                  <a:alpha val="100000"/>
+                </a:srgbClr>
+              </a:solidFill>
+              <a:prstDash val="solid"/>
+              <a:miter/>
+            </a:ln>
           </p:spPr>
           <p:txBody>
             <a:bodyPr/>
@@ -4677,17 +4839,26 @@
           </p:nvSpPr>
           <p:spPr>
             <a:xfrm>
-              <a:off x="7889449" y="3981896"/>
-              <a:ext cx="319505" cy="930010"/>
+              <a:off x="7889449" y="3682822"/>
+              <a:ext cx="319505" cy="778799"/>
             </a:xfrm>
             <a:prstGeom prst="rect">
               <a:avLst/>
             </a:prstGeom>
             <a:solidFill>
-              <a:srgbClr val="ABD9E9">
+              <a:srgbClr val="B2ABD2">
                 <a:alpha val="100000"/>
               </a:srgbClr>
             </a:solidFill>
+            <a:ln w="13550" cap="flat">
+              <a:solidFill>
+                <a:srgbClr val="D3D3D3">
+                  <a:alpha val="100000"/>
+                </a:srgbClr>
+              </a:solidFill>
+              <a:prstDash val="solid"/>
+              <a:miter/>
+            </a:ln>
           </p:spPr>
           <p:txBody>
             <a:bodyPr/>
@@ -4705,17 +4876,26 @@
           </p:nvSpPr>
           <p:spPr>
             <a:xfrm>
-              <a:off x="8244454" y="4546000"/>
-              <a:ext cx="319505" cy="365905"/>
+              <a:off x="8244454" y="4155208"/>
+              <a:ext cx="319505" cy="306413"/>
             </a:xfrm>
             <a:prstGeom prst="rect">
               <a:avLst/>
             </a:prstGeom>
             <a:solidFill>
-              <a:srgbClr val="2C7BB6">
+              <a:srgbClr val="5E3C99">
                 <a:alpha val="100000"/>
               </a:srgbClr>
             </a:solidFill>
+            <a:ln w="13550" cap="flat">
+              <a:solidFill>
+                <a:srgbClr val="D3D3D3">
+                  <a:alpha val="100000"/>
+                </a:srgbClr>
+              </a:solidFill>
+              <a:prstDash val="solid"/>
+              <a:miter/>
+            </a:ln>
           </p:spPr>
           <p:txBody>
             <a:bodyPr/>
@@ -4794,7 +4974,7 @@
                 </a:spcAft>
               </a:pPr>
               <a:r>
-                <a:rPr sz="880" dirty="0">
+                <a:rPr sz="880">
                   <a:solidFill>
                     <a:srgbClr val="1A1A1A">
                       <a:alpha val="100000"/>
@@ -4803,31 +4983,7 @@
                   <a:latin typeface="Arial"/>
                   <a:cs typeface="Arial"/>
                 </a:rPr>
-                <a:t>Birds</a:t>
-              </a:r>
-              <a:r>
-                <a:rPr lang="de-DE" sz="880" dirty="0">
-                  <a:solidFill>
-                    <a:srgbClr val="1A1A1A">
-                      <a:alpha val="100000"/>
-                    </a:srgbClr>
-                  </a:solidFill>
-                  <a:latin typeface="Arial"/>
-                  <a:cs typeface="Arial"/>
-                </a:rPr>
-                <a:t> </a:t>
-              </a:r>
-              <a:r>
-                <a:rPr sz="880" dirty="0">
-                  <a:solidFill>
-                    <a:srgbClr val="1A1A1A">
-                      <a:alpha val="100000"/>
-                    </a:srgbClr>
-                  </a:solidFill>
-                  <a:latin typeface="Arial"/>
-                  <a:cs typeface="Arial"/>
-                </a:rPr>
-                <a:t>Czechia</a:t>
+                <a:t>Birds_Atlas_Czechia</a:t>
               </a:r>
             </a:p>
           </p:txBody>
@@ -4901,7 +5057,7 @@
                 </a:spcAft>
               </a:pPr>
               <a:r>
-                <a:rPr sz="880" dirty="0">
+                <a:rPr sz="880">
                   <a:solidFill>
                     <a:srgbClr val="1A1A1A">
                       <a:alpha val="100000"/>
@@ -4910,29 +5066,8 @@
                   <a:latin typeface="Arial"/>
                   <a:cs typeface="Arial"/>
                 </a:rPr>
-                <a:t>Birds</a:t>
+                <a:t>Birds_atlas_EBBA</a:t>
               </a:r>
-              <a:r>
-                <a:rPr lang="de-DE" sz="880" dirty="0">
-                  <a:solidFill>
-                    <a:srgbClr val="1A1A1A">
-                      <a:alpha val="100000"/>
-                    </a:srgbClr>
-                  </a:solidFill>
-                  <a:latin typeface="Arial"/>
-                  <a:cs typeface="Arial"/>
-                </a:rPr>
-                <a:t> Europe</a:t>
-              </a:r>
-              <a:endParaRPr sz="880" dirty="0">
-                <a:solidFill>
-                  <a:srgbClr val="1A1A1A">
-                    <a:alpha val="100000"/>
-                  </a:srgbClr>
-                </a:solidFill>
-                <a:latin typeface="Arial"/>
-                <a:cs typeface="Arial"/>
-              </a:endParaRPr>
             </a:p>
           </p:txBody>
         </p:sp>
@@ -5005,7 +5140,7 @@
                 </a:spcAft>
               </a:pPr>
               <a:r>
-                <a:rPr sz="880" dirty="0">
+                <a:rPr sz="880">
                   <a:solidFill>
                     <a:srgbClr val="1A1A1A">
                       <a:alpha val="100000"/>
@@ -5014,31 +5149,7 @@
                   <a:latin typeface="Arial"/>
                   <a:cs typeface="Arial"/>
                 </a:rPr>
-                <a:t>Birds</a:t>
-              </a:r>
-              <a:r>
-                <a:rPr lang="de-DE" sz="880" dirty="0">
-                  <a:solidFill>
-                    <a:srgbClr val="1A1A1A">
-                      <a:alpha val="100000"/>
-                    </a:srgbClr>
-                  </a:solidFill>
-                  <a:latin typeface="Arial"/>
-                  <a:cs typeface="Arial"/>
-                </a:rPr>
-                <a:t> </a:t>
-              </a:r>
-              <a:r>
-                <a:rPr sz="880" dirty="0">
-                  <a:solidFill>
-                    <a:srgbClr val="1A1A1A">
-                      <a:alpha val="100000"/>
-                    </a:srgbClr>
-                  </a:solidFill>
-                  <a:latin typeface="Arial"/>
-                  <a:cs typeface="Arial"/>
-                </a:rPr>
-                <a:t>Japan</a:t>
+                <a:t>Birds_atlas_Japan</a:t>
               </a:r>
             </a:p>
           </p:txBody>
@@ -5112,7 +5223,7 @@
                 </a:spcAft>
               </a:pPr>
               <a:r>
-                <a:rPr sz="880" dirty="0">
+                <a:rPr sz="880">
                   <a:solidFill>
                     <a:srgbClr val="1A1A1A">
                       <a:alpha val="100000"/>
@@ -5121,56 +5232,8 @@
                   <a:latin typeface="Arial"/>
                   <a:cs typeface="Arial"/>
                 </a:rPr>
-                <a:t>Birds</a:t>
+                <a:t>Birds_Atlas_New_York</a:t>
               </a:r>
-              <a:r>
-                <a:rPr lang="de-DE" sz="880" dirty="0">
-                  <a:solidFill>
-                    <a:srgbClr val="1A1A1A">
-                      <a:alpha val="100000"/>
-                    </a:srgbClr>
-                  </a:solidFill>
-                  <a:latin typeface="Arial"/>
-                  <a:cs typeface="Arial"/>
-                </a:rPr>
-                <a:t> </a:t>
-              </a:r>
-              <a:r>
-                <a:rPr sz="880" dirty="0">
-                  <a:solidFill>
-                    <a:srgbClr val="1A1A1A">
-                      <a:alpha val="100000"/>
-                    </a:srgbClr>
-                  </a:solidFill>
-                  <a:latin typeface="Arial"/>
-                  <a:cs typeface="Arial"/>
-                </a:rPr>
-                <a:t>New</a:t>
-              </a:r>
-              <a:r>
-                <a:rPr lang="de-DE" sz="880" dirty="0">
-                  <a:solidFill>
-                    <a:srgbClr val="1A1A1A">
-                      <a:alpha val="100000"/>
-                    </a:srgbClr>
-                  </a:solidFill>
-                  <a:latin typeface="Arial"/>
-                  <a:cs typeface="Arial"/>
-                </a:rPr>
-                <a:t> </a:t>
-              </a:r>
-              <a:r>
-                <a:rPr sz="880" dirty="0">
-                  <a:solidFill>
-                    <a:srgbClr val="1A1A1A">
-                      <a:alpha val="100000"/>
-                    </a:srgbClr>
-                  </a:solidFill>
-                  <a:latin typeface="Arial"/>
-                  <a:cs typeface="Arial"/>
-                </a:rPr>
-                <a:t>York</a:t>
-              </a:r>
             </a:p>
           </p:txBody>
         </p:sp>
@@ -5182,7 +5245,7 @@
           </p:nvSpPr>
           <p:spPr>
             <a:xfrm>
-              <a:off x="1024325" y="5043784"/>
+              <a:off x="1024325" y="4572058"/>
               <a:ext cx="1846029" cy="0"/>
             </a:xfrm>
             <a:custGeom>
@@ -5228,7 +5291,7 @@
           </p:nvSpPr>
           <p:spPr>
             <a:xfrm>
-              <a:off x="1237329" y="5043784"/>
+              <a:off x="1237329" y="4572058"/>
               <a:ext cx="0" cy="34794"/>
             </a:xfrm>
             <a:custGeom>
@@ -5274,7 +5337,7 @@
           </p:nvSpPr>
           <p:spPr>
             <a:xfrm>
-              <a:off x="1592334" y="5043784"/>
+              <a:off x="1592334" y="4572058"/>
               <a:ext cx="0" cy="34794"/>
             </a:xfrm>
             <a:custGeom>
@@ -5320,7 +5383,7 @@
           </p:nvSpPr>
           <p:spPr>
             <a:xfrm>
-              <a:off x="1947340" y="5043784"/>
+              <a:off x="1947340" y="4572058"/>
               <a:ext cx="0" cy="34794"/>
             </a:xfrm>
             <a:custGeom>
@@ -5366,7 +5429,7 @@
           </p:nvSpPr>
           <p:spPr>
             <a:xfrm>
-              <a:off x="2302346" y="5043784"/>
+              <a:off x="2302346" y="4572058"/>
               <a:ext cx="0" cy="34794"/>
             </a:xfrm>
             <a:custGeom>
@@ -5412,7 +5475,7 @@
           </p:nvSpPr>
           <p:spPr>
             <a:xfrm>
-              <a:off x="2657351" y="5043784"/>
+              <a:off x="2657351" y="4572058"/>
               <a:ext cx="0" cy="34794"/>
             </a:xfrm>
             <a:custGeom>
@@ -5457,9 +5520,9 @@
             <p:nvPr/>
           </p:nvSpPr>
           <p:spPr>
-            <a:xfrm rot="18900000">
-              <a:off x="488524" y="5525149"/>
-              <a:ext cx="910704" cy="117636"/>
+            <a:xfrm rot="-2700000">
+              <a:off x="67613" y="5138996"/>
+              <a:ext cx="1514264" cy="119186"/>
             </a:xfrm>
             <a:prstGeom prst="rect">
               <a:avLst/>
@@ -5482,7 +5545,7 @@
                 </a:spcAft>
               </a:pPr>
               <a:r>
-                <a:rPr sz="1000" dirty="0">
+                <a:rPr sz="1000">
                   <a:solidFill>
                     <a:srgbClr val="4D4D4D">
                       <a:alpha val="100000"/>
@@ -5491,7 +5554,7 @@
                   <a:latin typeface="Arial"/>
                   <a:cs typeface="Arial"/>
                 </a:rPr>
-                <a:t>strong decrease</a:t>
+                <a:t>strong decrease (&gt; halfing)</a:t>
               </a:r>
             </a:p>
           </p:txBody>
@@ -5503,9 +5566,9 @@
             <p:nvPr/>
           </p:nvSpPr>
           <p:spPr>
-            <a:xfrm rot="18900000">
-              <a:off x="931180" y="5521102"/>
-              <a:ext cx="854211" cy="92396"/>
+            <a:xfrm rot="-2700000">
+              <a:off x="466844" y="5123018"/>
+              <a:ext cx="1457771" cy="119186"/>
             </a:xfrm>
             <a:prstGeom prst="rect">
               <a:avLst/>
@@ -5528,7 +5591,7 @@
                 </a:spcAft>
               </a:pPr>
               <a:r>
-                <a:rPr sz="1000" dirty="0">
+                <a:rPr sz="1000">
                   <a:solidFill>
                     <a:srgbClr val="4D4D4D">
                       <a:alpha val="100000"/>
@@ -5537,7 +5600,7 @@
                   <a:latin typeface="Arial"/>
                   <a:cs typeface="Arial"/>
                 </a:rPr>
-                <a:t>weak decrease</a:t>
+                <a:t>weak decrease (&lt; halfing)</a:t>
               </a:r>
             </a:p>
           </p:txBody>
@@ -5550,7 +5613,7 @@
           </p:nvSpPr>
           <p:spPr>
             <a:xfrm rot="-2700000">
-              <a:off x="1707226" y="5253971"/>
+              <a:off x="1707226" y="4829417"/>
               <a:ext cx="338894" cy="92397"/>
             </a:xfrm>
             <a:prstGeom prst="rect">
@@ -5595,9 +5658,9 @@
             <p:nvPr/>
           </p:nvSpPr>
           <p:spPr>
-            <a:xfrm rot="18900000">
-              <a:off x="1658080" y="5446261"/>
-              <a:ext cx="811795" cy="92396"/>
+            <a:xfrm rot="-2700000">
+              <a:off x="1127096" y="5140996"/>
+              <a:ext cx="1521333" cy="119186"/>
             </a:xfrm>
             <a:prstGeom prst="rect">
               <a:avLst/>
@@ -5620,7 +5683,7 @@
                 </a:spcAft>
               </a:pPr>
               <a:r>
-                <a:rPr sz="1000" dirty="0">
+                <a:rPr sz="1000">
                   <a:solidFill>
                     <a:srgbClr val="4D4D4D">
                       <a:alpha val="100000"/>
@@ -5629,7 +5692,7 @@
                   <a:latin typeface="Arial"/>
                   <a:cs typeface="Arial"/>
                 </a:rPr>
-                <a:t>weak increase</a:t>
+                <a:t>weak increase (&lt; doubling)</a:t>
               </a:r>
             </a:p>
           </p:txBody>
@@ -5641,9 +5704,9 @@
             <p:nvPr/>
           </p:nvSpPr>
           <p:spPr>
-            <a:xfrm rot="18900000">
-              <a:off x="1978736" y="5450232"/>
-              <a:ext cx="868288" cy="117636"/>
+            <a:xfrm rot="-2700000">
+              <a:off x="1437877" y="5156974"/>
+              <a:ext cx="1577826" cy="119186"/>
             </a:xfrm>
             <a:prstGeom prst="rect">
               <a:avLst/>
@@ -5666,7 +5729,7 @@
                 </a:spcAft>
               </a:pPr>
               <a:r>
-                <a:rPr sz="1000" dirty="0">
+                <a:rPr sz="1000">
                   <a:solidFill>
                     <a:srgbClr val="4D4D4D">
                       <a:alpha val="100000"/>
@@ -5675,7 +5738,7 @@
                   <a:latin typeface="Arial"/>
                   <a:cs typeface="Arial"/>
                 </a:rPr>
-                <a:t>strong increase</a:t>
+                <a:t>strong increase (&gt; doubling)</a:t>
               </a:r>
             </a:p>
           </p:txBody>
@@ -5688,7 +5751,7 @@
           </p:nvSpPr>
           <p:spPr>
             <a:xfrm>
-              <a:off x="2939944" y="5043784"/>
+              <a:off x="2939944" y="4572058"/>
               <a:ext cx="1846029" cy="0"/>
             </a:xfrm>
             <a:custGeom>
@@ -5734,7 +5797,7 @@
           </p:nvSpPr>
           <p:spPr>
             <a:xfrm>
-              <a:off x="3152947" y="5043784"/>
+              <a:off x="3152947" y="4572058"/>
               <a:ext cx="0" cy="34794"/>
             </a:xfrm>
             <a:custGeom>
@@ -5780,7 +5843,7 @@
           </p:nvSpPr>
           <p:spPr>
             <a:xfrm>
-              <a:off x="3507953" y="5043784"/>
+              <a:off x="3507953" y="4572058"/>
               <a:ext cx="0" cy="34794"/>
             </a:xfrm>
             <a:custGeom>
@@ -5826,7 +5889,7 @@
           </p:nvSpPr>
           <p:spPr>
             <a:xfrm>
-              <a:off x="3862959" y="5043784"/>
+              <a:off x="3862959" y="4572058"/>
               <a:ext cx="0" cy="34794"/>
             </a:xfrm>
             <a:custGeom>
@@ -5872,7 +5935,7 @@
           </p:nvSpPr>
           <p:spPr>
             <a:xfrm>
-              <a:off x="4217964" y="5043784"/>
+              <a:off x="4217964" y="4572058"/>
               <a:ext cx="0" cy="34794"/>
             </a:xfrm>
             <a:custGeom>
@@ -5918,7 +5981,7 @@
           </p:nvSpPr>
           <p:spPr>
             <a:xfrm>
-              <a:off x="4572970" y="5043784"/>
+              <a:off x="4572970" y="4572058"/>
               <a:ext cx="0" cy="34794"/>
             </a:xfrm>
             <a:custGeom>
@@ -5963,9 +6026,9 @@
             <p:nvPr/>
           </p:nvSpPr>
           <p:spPr>
-            <a:xfrm rot="18900000">
-              <a:off x="2395545" y="5490611"/>
-              <a:ext cx="910704" cy="117636"/>
+            <a:xfrm rot="-2700000">
+              <a:off x="1983232" y="5138996"/>
+              <a:ext cx="1514264" cy="119186"/>
             </a:xfrm>
             <a:prstGeom prst="rect">
               <a:avLst/>
@@ -5988,7 +6051,7 @@
                 </a:spcAft>
               </a:pPr>
               <a:r>
-                <a:rPr sz="1000" dirty="0">
+                <a:rPr sz="1000">
                   <a:solidFill>
                     <a:srgbClr val="4D4D4D">
                       <a:alpha val="100000"/>
@@ -5997,7 +6060,7 @@
                   <a:latin typeface="Arial"/>
                   <a:cs typeface="Arial"/>
                 </a:rPr>
-                <a:t>strong decrease</a:t>
+                <a:t>strong decrease (&gt; halfing)</a:t>
               </a:r>
             </a:p>
           </p:txBody>
@@ -6009,9 +6072,9 @@
             <p:nvPr/>
           </p:nvSpPr>
           <p:spPr>
-            <a:xfrm rot="18900000">
-              <a:off x="2838375" y="5509625"/>
-              <a:ext cx="854211" cy="92396"/>
+            <a:xfrm rot="-2700000">
+              <a:off x="2382463" y="5123018"/>
+              <a:ext cx="1457771" cy="119186"/>
             </a:xfrm>
             <a:prstGeom prst="rect">
               <a:avLst/>
@@ -6034,7 +6097,7 @@
                 </a:spcAft>
               </a:pPr>
               <a:r>
-                <a:rPr sz="1000" dirty="0">
+                <a:rPr sz="1000">
                   <a:solidFill>
                     <a:srgbClr val="4D4D4D">
                       <a:alpha val="100000"/>
@@ -6043,7 +6106,7 @@
                   <a:latin typeface="Arial"/>
                   <a:cs typeface="Arial"/>
                 </a:rPr>
-                <a:t>weak decrease</a:t>
+                <a:t>weak decrease (&lt; halfing)</a:t>
               </a:r>
             </a:p>
           </p:txBody>
@@ -6055,9 +6118,9 @@
             <p:nvPr/>
           </p:nvSpPr>
           <p:spPr>
-            <a:xfrm rot="18900000">
-              <a:off x="3572797" y="5221687"/>
-              <a:ext cx="338894" cy="92396"/>
+            <a:xfrm rot="-2700000">
+              <a:off x="3622845" y="4829417"/>
+              <a:ext cx="338894" cy="92397"/>
             </a:xfrm>
             <a:prstGeom prst="rect">
               <a:avLst/>
@@ -6080,7 +6143,7 @@
                 </a:spcAft>
               </a:pPr>
               <a:r>
-                <a:rPr sz="1000" dirty="0">
+                <a:rPr sz="1000">
                   <a:solidFill>
                     <a:srgbClr val="4D4D4D">
                       <a:alpha val="100000"/>
@@ -6101,9 +6164,9 @@
             <p:nvPr/>
           </p:nvSpPr>
           <p:spPr>
-            <a:xfrm rot="18900000">
-              <a:off x="3538753" y="5485760"/>
-              <a:ext cx="811795" cy="92396"/>
+            <a:xfrm rot="-2700000">
+              <a:off x="3042715" y="5140996"/>
+              <a:ext cx="1521333" cy="119186"/>
             </a:xfrm>
             <a:prstGeom prst="rect">
               <a:avLst/>
@@ -6126,7 +6189,7 @@
                 </a:spcAft>
               </a:pPr>
               <a:r>
-                <a:rPr sz="1000" dirty="0">
+                <a:rPr sz="1000">
                   <a:solidFill>
                     <a:srgbClr val="4D4D4D">
                       <a:alpha val="100000"/>
@@ -6135,7 +6198,7 @@
                   <a:latin typeface="Arial"/>
                   <a:cs typeface="Arial"/>
                 </a:rPr>
-                <a:t>weak increase</a:t>
+                <a:t>weak increase (&lt; doubling)</a:t>
               </a:r>
             </a:p>
           </p:txBody>
@@ -6147,9 +6210,9 @@
             <p:nvPr/>
           </p:nvSpPr>
           <p:spPr>
-            <a:xfrm rot="18900000">
-              <a:off x="3857602" y="5466086"/>
-              <a:ext cx="868288" cy="117636"/>
+            <a:xfrm rot="-2700000">
+              <a:off x="3353496" y="5156974"/>
+              <a:ext cx="1577826" cy="119186"/>
             </a:xfrm>
             <a:prstGeom prst="rect">
               <a:avLst/>
@@ -6172,7 +6235,7 @@
                 </a:spcAft>
               </a:pPr>
               <a:r>
-                <a:rPr sz="1000" dirty="0">
+                <a:rPr sz="1000">
                   <a:solidFill>
                     <a:srgbClr val="4D4D4D">
                       <a:alpha val="100000"/>
@@ -6181,7 +6244,7 @@
                   <a:latin typeface="Arial"/>
                   <a:cs typeface="Arial"/>
                 </a:rPr>
-                <a:t>strong increase</a:t>
+                <a:t>strong increase (&gt; doubling)</a:t>
               </a:r>
             </a:p>
           </p:txBody>
@@ -6194,7 +6257,7 @@
           </p:nvSpPr>
           <p:spPr>
             <a:xfrm>
-              <a:off x="4855562" y="5043784"/>
+              <a:off x="4855562" y="4572058"/>
               <a:ext cx="1846029" cy="0"/>
             </a:xfrm>
             <a:custGeom>
@@ -6240,7 +6303,7 @@
           </p:nvSpPr>
           <p:spPr>
             <a:xfrm>
-              <a:off x="5068566" y="5043784"/>
+              <a:off x="5068566" y="4572058"/>
               <a:ext cx="0" cy="34794"/>
             </a:xfrm>
             <a:custGeom>
@@ -6286,7 +6349,7 @@
           </p:nvSpPr>
           <p:spPr>
             <a:xfrm>
-              <a:off x="5423571" y="5043784"/>
+              <a:off x="5423571" y="4572058"/>
               <a:ext cx="0" cy="34794"/>
             </a:xfrm>
             <a:custGeom>
@@ -6332,7 +6395,7 @@
           </p:nvSpPr>
           <p:spPr>
             <a:xfrm>
-              <a:off x="5778577" y="5043784"/>
+              <a:off x="5778577" y="4572058"/>
               <a:ext cx="0" cy="34794"/>
             </a:xfrm>
             <a:custGeom>
@@ -6378,7 +6441,7 @@
           </p:nvSpPr>
           <p:spPr>
             <a:xfrm>
-              <a:off x="6133583" y="5043784"/>
+              <a:off x="6133583" y="4572058"/>
               <a:ext cx="0" cy="34794"/>
             </a:xfrm>
             <a:custGeom>
@@ -6424,7 +6487,7 @@
           </p:nvSpPr>
           <p:spPr>
             <a:xfrm>
-              <a:off x="6488588" y="5043784"/>
+              <a:off x="6488588" y="4572058"/>
               <a:ext cx="0" cy="34794"/>
             </a:xfrm>
             <a:custGeom>
@@ -6469,9 +6532,9 @@
             <p:nvPr/>
           </p:nvSpPr>
           <p:spPr>
-            <a:xfrm rot="18900000">
-              <a:off x="4309800" y="5526154"/>
-              <a:ext cx="910704" cy="117636"/>
+            <a:xfrm rot="-2700000">
+              <a:off x="3898851" y="5138996"/>
+              <a:ext cx="1514264" cy="119186"/>
             </a:xfrm>
             <a:prstGeom prst="rect">
               <a:avLst/>
@@ -6494,7 +6557,7 @@
                 </a:spcAft>
               </a:pPr>
               <a:r>
-                <a:rPr sz="1000" dirty="0">
+                <a:rPr sz="1000">
                   <a:solidFill>
                     <a:srgbClr val="4D4D4D">
                       <a:alpha val="100000"/>
@@ -6503,7 +6566,7 @@
                   <a:latin typeface="Arial"/>
                   <a:cs typeface="Arial"/>
                 </a:rPr>
-                <a:t>strong decrease</a:t>
+                <a:t>strong decrease (&gt; halfing)</a:t>
               </a:r>
             </a:p>
           </p:txBody>
@@ -6515,9 +6578,9 @@
             <p:nvPr/>
           </p:nvSpPr>
           <p:spPr>
-            <a:xfrm rot="18900000">
-              <a:off x="4761855" y="5485759"/>
-              <a:ext cx="854211" cy="92396"/>
+            <a:xfrm rot="-2700000">
+              <a:off x="4298081" y="5123018"/>
+              <a:ext cx="1457771" cy="119186"/>
             </a:xfrm>
             <a:prstGeom prst="rect">
               <a:avLst/>
@@ -6540,7 +6603,7 @@
                 </a:spcAft>
               </a:pPr>
               <a:r>
-                <a:rPr sz="1000" dirty="0">
+                <a:rPr sz="1000">
                   <a:solidFill>
                     <a:srgbClr val="4D4D4D">
                       <a:alpha val="100000"/>
@@ -6549,7 +6612,7 @@
                   <a:latin typeface="Arial"/>
                   <a:cs typeface="Arial"/>
                 </a:rPr>
-                <a:t>weak decrease</a:t>
+                <a:t>weak decrease (&lt; halfing)</a:t>
               </a:r>
             </a:p>
           </p:txBody>
@@ -6561,9 +6624,9 @@
             <p:nvPr/>
           </p:nvSpPr>
           <p:spPr>
-            <a:xfrm rot="18900000">
-              <a:off x="5503988" y="5241521"/>
-              <a:ext cx="338894" cy="92396"/>
+            <a:xfrm rot="-2700000">
+              <a:off x="5538463" y="4829417"/>
+              <a:ext cx="338894" cy="92397"/>
             </a:xfrm>
             <a:prstGeom prst="rect">
               <a:avLst/>
@@ -6586,7 +6649,7 @@
                 </a:spcAft>
               </a:pPr>
               <a:r>
-                <a:rPr sz="1000" dirty="0">
+                <a:rPr sz="1000">
                   <a:solidFill>
                     <a:srgbClr val="4D4D4D">
                       <a:alpha val="100000"/>
@@ -6607,9 +6670,9 @@
             <p:nvPr/>
           </p:nvSpPr>
           <p:spPr>
-            <a:xfrm rot="18900000">
-              <a:off x="5487965" y="5471230"/>
-              <a:ext cx="811795" cy="92396"/>
+            <a:xfrm rot="-2700000">
+              <a:off x="4958333" y="5140996"/>
+              <a:ext cx="1521333" cy="119186"/>
             </a:xfrm>
             <a:prstGeom prst="rect">
               <a:avLst/>
@@ -6632,7 +6695,7 @@
                 </a:spcAft>
               </a:pPr>
               <a:r>
-                <a:rPr sz="1000" dirty="0">
+                <a:rPr sz="1000">
                   <a:solidFill>
                     <a:srgbClr val="4D4D4D">
                       <a:alpha val="100000"/>
@@ -6641,7 +6704,7 @@
                   <a:latin typeface="Arial"/>
                   <a:cs typeface="Arial"/>
                 </a:rPr>
-                <a:t>weak increase</a:t>
+                <a:t>weak increase (&lt; doubling)</a:t>
               </a:r>
             </a:p>
           </p:txBody>
@@ -6653,9 +6716,9 @@
             <p:nvPr/>
           </p:nvSpPr>
           <p:spPr>
-            <a:xfrm rot="18900000">
-              <a:off x="5818931" y="5450232"/>
-              <a:ext cx="868288" cy="117636"/>
+            <a:xfrm rot="-2700000">
+              <a:off x="5269114" y="5156974"/>
+              <a:ext cx="1577826" cy="119186"/>
             </a:xfrm>
             <a:prstGeom prst="rect">
               <a:avLst/>
@@ -6678,7 +6741,7 @@
                 </a:spcAft>
               </a:pPr>
               <a:r>
-                <a:rPr sz="1000" dirty="0">
+                <a:rPr sz="1000">
                   <a:solidFill>
                     <a:srgbClr val="4D4D4D">
                       <a:alpha val="100000"/>
@@ -6687,7 +6750,7 @@
                   <a:latin typeface="Arial"/>
                   <a:cs typeface="Arial"/>
                 </a:rPr>
-                <a:t>strong increase</a:t>
+                <a:t>strong increase (&gt; doubling)</a:t>
               </a:r>
             </a:p>
           </p:txBody>
@@ -6700,7 +6763,7 @@
           </p:nvSpPr>
           <p:spPr>
             <a:xfrm>
-              <a:off x="6771181" y="5043784"/>
+              <a:off x="6771181" y="4572058"/>
               <a:ext cx="1846029" cy="0"/>
             </a:xfrm>
             <a:custGeom>
@@ -6746,7 +6809,7 @@
           </p:nvSpPr>
           <p:spPr>
             <a:xfrm>
-              <a:off x="6984184" y="5043784"/>
+              <a:off x="6984184" y="4572058"/>
               <a:ext cx="0" cy="34794"/>
             </a:xfrm>
             <a:custGeom>
@@ -6792,7 +6855,7 @@
           </p:nvSpPr>
           <p:spPr>
             <a:xfrm>
-              <a:off x="7339190" y="5043784"/>
+              <a:off x="7339190" y="4572058"/>
               <a:ext cx="0" cy="34794"/>
             </a:xfrm>
             <a:custGeom>
@@ -6838,7 +6901,7 @@
           </p:nvSpPr>
           <p:spPr>
             <a:xfrm>
-              <a:off x="7694196" y="5043784"/>
+              <a:off x="7694196" y="4572058"/>
               <a:ext cx="0" cy="34794"/>
             </a:xfrm>
             <a:custGeom>
@@ -6884,7 +6947,7 @@
           </p:nvSpPr>
           <p:spPr>
             <a:xfrm>
-              <a:off x="8049201" y="5043784"/>
+              <a:off x="8049201" y="4572058"/>
               <a:ext cx="0" cy="34794"/>
             </a:xfrm>
             <a:custGeom>
@@ -6930,7 +6993,7 @@
           </p:nvSpPr>
           <p:spPr>
             <a:xfrm>
-              <a:off x="8404207" y="5043784"/>
+              <a:off x="8404207" y="4572058"/>
               <a:ext cx="0" cy="34794"/>
             </a:xfrm>
             <a:custGeom>
@@ -6975,9 +7038,9 @@
             <p:nvPr/>
           </p:nvSpPr>
           <p:spPr>
-            <a:xfrm rot="18900000">
-              <a:off x="6252600" y="5517069"/>
-              <a:ext cx="910704" cy="117636"/>
+            <a:xfrm rot="-2700000">
+              <a:off x="5814469" y="5138996"/>
+              <a:ext cx="1514264" cy="119186"/>
             </a:xfrm>
             <a:prstGeom prst="rect">
               <a:avLst/>
@@ -7000,7 +7063,7 @@
                 </a:spcAft>
               </a:pPr>
               <a:r>
-                <a:rPr sz="1000" dirty="0">
+                <a:rPr sz="1000">
                   <a:solidFill>
                     <a:srgbClr val="4D4D4D">
                       <a:alpha val="100000"/>
@@ -7009,7 +7072,7 @@
                   <a:latin typeface="Arial"/>
                   <a:cs typeface="Arial"/>
                 </a:rPr>
-                <a:t>strong decrease</a:t>
+                <a:t>strong decrease (&gt; halfing)</a:t>
               </a:r>
             </a:p>
           </p:txBody>
@@ -7021,9 +7084,9 @@
             <p:nvPr/>
           </p:nvSpPr>
           <p:spPr>
-            <a:xfrm rot="18900000">
-              <a:off x="6643685" y="5483576"/>
-              <a:ext cx="854211" cy="92396"/>
+            <a:xfrm rot="-2700000">
+              <a:off x="6213700" y="5123018"/>
+              <a:ext cx="1457771" cy="119186"/>
             </a:xfrm>
             <a:prstGeom prst="rect">
               <a:avLst/>
@@ -7046,7 +7109,7 @@
                 </a:spcAft>
               </a:pPr>
               <a:r>
-                <a:rPr sz="1000" dirty="0">
+                <a:rPr sz="1000">
                   <a:solidFill>
                     <a:srgbClr val="4D4D4D">
                       <a:alpha val="100000"/>
@@ -7055,7 +7118,7 @@
                   <a:latin typeface="Arial"/>
                   <a:cs typeface="Arial"/>
                 </a:rPr>
-                <a:t>weak decrease</a:t>
+                <a:t>weak decrease (&lt; halfing)</a:t>
               </a:r>
             </a:p>
           </p:txBody>
@@ -7067,9 +7130,9 @@
             <p:nvPr/>
           </p:nvSpPr>
           <p:spPr>
-            <a:xfrm rot="18900000">
-              <a:off x="7411479" y="5241644"/>
-              <a:ext cx="338894" cy="92396"/>
+            <a:xfrm rot="-2700000">
+              <a:off x="7454082" y="4829417"/>
+              <a:ext cx="338894" cy="92397"/>
             </a:xfrm>
             <a:prstGeom prst="rect">
               <a:avLst/>
@@ -7092,7 +7155,7 @@
                 </a:spcAft>
               </a:pPr>
               <a:r>
-                <a:rPr sz="1000" dirty="0">
+                <a:rPr sz="1000">
                   <a:solidFill>
                     <a:srgbClr val="4D4D4D">
                       <a:alpha val="100000"/>
@@ -7113,9 +7176,9 @@
             <p:nvPr/>
           </p:nvSpPr>
           <p:spPr>
-            <a:xfrm rot="18900000">
-              <a:off x="7380214" y="5446263"/>
-              <a:ext cx="811795" cy="92396"/>
+            <a:xfrm rot="-2700000">
+              <a:off x="6873952" y="5140996"/>
+              <a:ext cx="1521333" cy="119186"/>
             </a:xfrm>
             <a:prstGeom prst="rect">
               <a:avLst/>
@@ -7138,7 +7201,7 @@
                 </a:spcAft>
               </a:pPr>
               <a:r>
-                <a:rPr sz="1000" dirty="0">
+                <a:rPr sz="1000">
                   <a:solidFill>
                     <a:srgbClr val="4D4D4D">
                       <a:alpha val="100000"/>
@@ -7147,7 +7210,7 @@
                   <a:latin typeface="Arial"/>
                   <a:cs typeface="Arial"/>
                 </a:rPr>
-                <a:t>weak increase</a:t>
+                <a:t>weak increase (&lt; doubling)</a:t>
               </a:r>
             </a:p>
           </p:txBody>
@@ -7159,9 +7222,9 @@
             <p:nvPr/>
           </p:nvSpPr>
           <p:spPr>
-            <a:xfrm rot="18900000">
-              <a:off x="7705954" y="5466086"/>
-              <a:ext cx="868288" cy="117636"/>
+            <a:xfrm rot="-2700000">
+              <a:off x="7184733" y="5156974"/>
+              <a:ext cx="1577826" cy="119186"/>
             </a:xfrm>
             <a:prstGeom prst="rect">
               <a:avLst/>
@@ -7184,7 +7247,7 @@
                 </a:spcAft>
               </a:pPr>
               <a:r>
-                <a:rPr sz="1000" dirty="0">
+                <a:rPr sz="1000">
                   <a:solidFill>
                     <a:srgbClr val="4D4D4D">
                       <a:alpha val="100000"/>
@@ -7193,7 +7256,7 @@
                   <a:latin typeface="Arial"/>
                   <a:cs typeface="Arial"/>
                 </a:rPr>
-                <a:t>strong increase</a:t>
+                <a:t>strong increase (&gt; doubling)</a:t>
               </a:r>
             </a:p>
           </p:txBody>
@@ -7207,7 +7270,7 @@
           <p:spPr>
             <a:xfrm>
               <a:off x="1024325" y="2142458"/>
-              <a:ext cx="0" cy="2901326"/>
+              <a:ext cx="0" cy="2429599"/>
             </a:xfrm>
             <a:custGeom>
               <a:avLst/>
@@ -7216,9 +7279,9 @@
               <a:cxnLst/>
               <a:rect l="0" t="0" r="0" b="0"/>
               <a:pathLst>
-                <a:path h="2901326">
+                <a:path h="2429599">
                   <a:moveTo>
-                    <a:pt x="0" y="2901326"/>
+                    <a:pt x="0" y="2429599"/>
                   </a:moveTo>
                   <a:lnTo>
                     <a:pt x="0" y="0"/>
@@ -7252,7 +7315,7 @@
           </p:nvSpPr>
           <p:spPr>
             <a:xfrm>
-              <a:off x="891064" y="4864529"/>
+              <a:off x="891064" y="4414245"/>
               <a:ext cx="70631" cy="92831"/>
             </a:xfrm>
             <a:prstGeom prst="rect">
@@ -7298,7 +7361,7 @@
           </p:nvSpPr>
           <p:spPr>
             <a:xfrm>
-              <a:off x="820432" y="4102226"/>
+              <a:off x="820432" y="3775884"/>
               <a:ext cx="141262" cy="92831"/>
             </a:xfrm>
             <a:prstGeom prst="rect">
@@ -7344,7 +7407,7 @@
           </p:nvSpPr>
           <p:spPr>
             <a:xfrm>
-              <a:off x="749801" y="3339922"/>
+              <a:off x="749801" y="3137524"/>
               <a:ext cx="211894" cy="92831"/>
             </a:xfrm>
             <a:prstGeom prst="rect">
@@ -7390,7 +7453,7 @@
           </p:nvSpPr>
           <p:spPr>
             <a:xfrm>
-              <a:off x="749801" y="2577619"/>
+              <a:off x="749801" y="2499163"/>
               <a:ext cx="211894" cy="92831"/>
             </a:xfrm>
             <a:prstGeom prst="rect">
@@ -7436,7 +7499,7 @@
           </p:nvSpPr>
           <p:spPr>
             <a:xfrm>
-              <a:off x="989531" y="4911906"/>
+              <a:off x="989531" y="4461622"/>
               <a:ext cx="34794" cy="0"/>
             </a:xfrm>
             <a:custGeom>
@@ -7482,7 +7545,7 @@
           </p:nvSpPr>
           <p:spPr>
             <a:xfrm>
-              <a:off x="989531" y="4149603"/>
+              <a:off x="989531" y="3823261"/>
               <a:ext cx="34794" cy="0"/>
             </a:xfrm>
             <a:custGeom>
@@ -7528,7 +7591,7 @@
           </p:nvSpPr>
           <p:spPr>
             <a:xfrm>
-              <a:off x="989531" y="3387299"/>
+              <a:off x="989531" y="3184901"/>
               <a:ext cx="34794" cy="0"/>
             </a:xfrm>
             <a:custGeom>
@@ -7574,7 +7637,7 @@
           </p:nvSpPr>
           <p:spPr>
             <a:xfrm>
-              <a:off x="989531" y="2624996"/>
+              <a:off x="989531" y="2546540"/>
               <a:ext cx="34794" cy="0"/>
             </a:xfrm>
             <a:custGeom>
@@ -7620,7 +7683,7 @@
           </p:nvSpPr>
           <p:spPr>
             <a:xfrm>
-              <a:off x="4052714" y="6121663"/>
+              <a:off x="4052715" y="5823013"/>
               <a:ext cx="1536104" cy="190797"/>
             </a:xfrm>
             <a:prstGeom prst="rect">
@@ -7644,7 +7707,7 @@
                 </a:spcAft>
               </a:pPr>
               <a:r>
-                <a:rPr sz="1600" dirty="0">
+                <a:rPr sz="1600">
                   <a:solidFill>
                     <a:srgbClr val="000000">
                       <a:alpha val="100000"/>
@@ -7666,7 +7729,7 @@
           </p:nvSpPr>
           <p:spPr>
             <a:xfrm rot="-5400000">
-              <a:off x="-285911" y="3498963"/>
+              <a:off x="-285911" y="3263099"/>
               <a:ext cx="1727993" cy="188317"/>
             </a:xfrm>
             <a:prstGeom prst="rect">

</xml_diff>